<commit_message>
Slide notes cleaned up
</commit_message>
<xml_diff>
--- a/doc/slac_slides.pptx
+++ b/doc/slac_slides.pptx
@@ -570,15 +570,7 @@
                 <a:ea typeface="Courier" charset="0"/>
                 <a:cs typeface="Courier" charset="0"/>
               </a:rPr>
-              <a:t>Multi-threading emulates concurrency but is expensive (context switching and memory</a:t>
-            </a:r>
-            <a:r>
-              <a:rPr lang="en-US" dirty="0" smtClean="0">
-                <a:latin typeface="Courier" charset="0"/>
-                <a:ea typeface="Courier" charset="0"/>
-                <a:cs typeface="Courier" charset="0"/>
-              </a:rPr>
-              <a:t>)</a:t>
+              <a:t>Multi-threading emulates concurrency but is expensive (context switching and memory)</a:t>
             </a:r>
           </a:p>
           <a:p>
@@ -2034,21 +2026,6 @@
             </a:r>
           </a:p>
           <a:p>
-            <a:endParaRPr lang="en-US" baseline="0" dirty="0" smtClean="0"/>
-          </a:p>
-          <a:p>
-            <a:r>
-              <a:rPr lang="en-US" baseline="0" dirty="0" smtClean="0"/>
-              <a:t>Execution:</a:t>
-            </a:r>
-          </a:p>
-          <a:p>
-            <a:r>
-              <a:rPr lang="en-US" baseline="0" dirty="0" smtClean="0"/>
-              <a:t>1. curl or browser</a:t>
-            </a:r>
-          </a:p>
-          <a:p>
             <a:r>
               <a:rPr lang="en-US" baseline="0" dirty="0" smtClean="0"/>
               <a:t> </a:t>
@@ -2137,53 +2114,6 @@
           <a:bodyPr/>
           <a:lstStyle/>
           <a:p>
-            <a:r>
-              <a:rPr lang="en-US" dirty="0" smtClean="0"/>
-              <a:t>Code:</a:t>
-            </a:r>
-          </a:p>
-          <a:p>
-            <a:r>
-              <a:rPr lang="en-US" dirty="0" smtClean="0"/>
-              <a:t>1. Get</a:t>
-            </a:r>
-            <a:r>
-              <a:rPr lang="en-US" baseline="0" dirty="0" smtClean="0"/>
-              <a:t> method callback with response object</a:t>
-            </a:r>
-          </a:p>
-          <a:p>
-            <a:r>
-              <a:rPr lang="en-US" baseline="0" dirty="0" smtClean="0"/>
-              <a:t>2. Event triggers (on "data", on "end")</a:t>
-            </a:r>
-          </a:p>
-          <a:p>
-            <a:r>
-              <a:rPr lang="en-US" baseline="0" dirty="0" smtClean="0"/>
-              <a:t>3. Nested functional implementations</a:t>
-            </a:r>
-          </a:p>
-          <a:p>
-            <a:endParaRPr lang="en-US" baseline="0" dirty="0" smtClean="0"/>
-          </a:p>
-          <a:p>
-            <a:r>
-              <a:rPr lang="en-US" baseline="0" dirty="0" smtClean="0"/>
-              <a:t>Execution:</a:t>
-            </a:r>
-          </a:p>
-          <a:p>
-            <a:r>
-              <a:rPr lang="en-US" baseline="0" dirty="0" smtClean="0"/>
-              <a:t>1. curl or browser</a:t>
-            </a:r>
-          </a:p>
-          <a:p>
-            <a:r>
-              <a:rPr lang="en-US" baseline="0" dirty="0" smtClean="0"/>
-              <a:t> </a:t>
-            </a:r>
             <a:endParaRPr lang="en-US" dirty="0"/>
           </a:p>
         </p:txBody>
@@ -2268,53 +2198,6 @@
           <a:bodyPr/>
           <a:lstStyle/>
           <a:p>
-            <a:r>
-              <a:rPr lang="en-US" dirty="0" smtClean="0"/>
-              <a:t>Code:</a:t>
-            </a:r>
-          </a:p>
-          <a:p>
-            <a:r>
-              <a:rPr lang="en-US" dirty="0" smtClean="0"/>
-              <a:t>1. Get</a:t>
-            </a:r>
-            <a:r>
-              <a:rPr lang="en-US" baseline="0" dirty="0" smtClean="0"/>
-              <a:t> method callback with response object</a:t>
-            </a:r>
-          </a:p>
-          <a:p>
-            <a:r>
-              <a:rPr lang="en-US" baseline="0" dirty="0" smtClean="0"/>
-              <a:t>2. Event triggers (on "data", on "end")</a:t>
-            </a:r>
-          </a:p>
-          <a:p>
-            <a:r>
-              <a:rPr lang="en-US" baseline="0" dirty="0" smtClean="0"/>
-              <a:t>3. Nested functional implementations</a:t>
-            </a:r>
-          </a:p>
-          <a:p>
-            <a:endParaRPr lang="en-US" baseline="0" dirty="0" smtClean="0"/>
-          </a:p>
-          <a:p>
-            <a:r>
-              <a:rPr lang="en-US" baseline="0" dirty="0" smtClean="0"/>
-              <a:t>Execution:</a:t>
-            </a:r>
-          </a:p>
-          <a:p>
-            <a:r>
-              <a:rPr lang="en-US" baseline="0" dirty="0" smtClean="0"/>
-              <a:t>1. curl or browser</a:t>
-            </a:r>
-          </a:p>
-          <a:p>
-            <a:r>
-              <a:rPr lang="en-US" baseline="0" dirty="0" smtClean="0"/>
-              <a:t> </a:t>
-            </a:r>
             <a:endParaRPr lang="en-US" dirty="0"/>
           </a:p>
         </p:txBody>
@@ -2399,53 +2282,6 @@
           <a:bodyPr/>
           <a:lstStyle/>
           <a:p>
-            <a:r>
-              <a:rPr lang="en-US" dirty="0" smtClean="0"/>
-              <a:t>Code:</a:t>
-            </a:r>
-          </a:p>
-          <a:p>
-            <a:r>
-              <a:rPr lang="en-US" dirty="0" smtClean="0"/>
-              <a:t>1. Get</a:t>
-            </a:r>
-            <a:r>
-              <a:rPr lang="en-US" baseline="0" dirty="0" smtClean="0"/>
-              <a:t> method callback with response object</a:t>
-            </a:r>
-          </a:p>
-          <a:p>
-            <a:r>
-              <a:rPr lang="en-US" baseline="0" dirty="0" smtClean="0"/>
-              <a:t>2. Event triggers (on "data", on "end")</a:t>
-            </a:r>
-          </a:p>
-          <a:p>
-            <a:r>
-              <a:rPr lang="en-US" baseline="0" dirty="0" smtClean="0"/>
-              <a:t>3. Nested functional implementations</a:t>
-            </a:r>
-          </a:p>
-          <a:p>
-            <a:endParaRPr lang="en-US" baseline="0" dirty="0" smtClean="0"/>
-          </a:p>
-          <a:p>
-            <a:r>
-              <a:rPr lang="en-US" baseline="0" dirty="0" smtClean="0"/>
-              <a:t>Execution:</a:t>
-            </a:r>
-          </a:p>
-          <a:p>
-            <a:r>
-              <a:rPr lang="en-US" baseline="0" dirty="0" smtClean="0"/>
-              <a:t>1. curl or browser</a:t>
-            </a:r>
-          </a:p>
-          <a:p>
-            <a:r>
-              <a:rPr lang="en-US" baseline="0" dirty="0" smtClean="0"/>
-              <a:t> </a:t>
-            </a:r>
             <a:endParaRPr lang="en-US" dirty="0"/>
           </a:p>
         </p:txBody>
@@ -2651,10 +2487,6 @@
           <a:bodyPr/>
           <a:lstStyle/>
           <a:p>
-            <a:r>
-              <a:rPr lang="en-US" dirty="0" smtClean="0"/>
-              <a:t>A single call stack</a:t>
-            </a:r>
             <a:endParaRPr lang="en-US" dirty="0"/>
           </a:p>
         </p:txBody>
@@ -9684,18 +9516,7 @@
                 <a:ea typeface="Courier" charset="0"/>
                 <a:cs typeface="Courier" charset="0"/>
               </a:rPr>
-              <a:t>cd </a:t>
-            </a:r>
-            <a:r>
-              <a:rPr lang="en-US" dirty="0">
-                <a:solidFill>
-                  <a:srgbClr val="FFFF00"/>
-                </a:solidFill>
-                <a:latin typeface="Courier" charset="0"/>
-                <a:ea typeface="Courier" charset="0"/>
-                <a:cs typeface="Courier" charset="0"/>
-              </a:rPr>
-              <a:t>examples/</a:t>
+              <a:t>cd examples/</a:t>
             </a:r>
             <a:r>
               <a:rPr lang="en-US" dirty="0" err="1">
@@ -9811,11 +9632,6 @@
               </a:rPr>
               <a:t>)</a:t>
             </a:r>
-            <a:endParaRPr lang="en-US" dirty="0" smtClean="0">
-              <a:latin typeface="Courier" charset="0"/>
-              <a:ea typeface="Courier" charset="0"/>
-              <a:cs typeface="Courier" charset="0"/>
-            </a:endParaRPr>
           </a:p>
           <a:p>
             <a:pPr marL="0" indent="0">
@@ -10011,11 +9827,6 @@
               </a:rPr>
               <a:t> </a:t>
             </a:r>
-            <a:endParaRPr lang="en-US" sz="2400" dirty="0" smtClean="0">
-              <a:latin typeface="Courier" charset="0"/>
-              <a:ea typeface="Courier" charset="0"/>
-              <a:cs typeface="Courier" charset="0"/>
-            </a:endParaRPr>
           </a:p>
           <a:p>
             <a:pPr marL="285750" indent="-285750">
@@ -10046,11 +9857,6 @@
               </a:rPr>
               <a:t> with SID, AUTH and phone#</a:t>
             </a:r>
-            <a:endParaRPr lang="en-US" sz="2400" dirty="0" smtClean="0">
-              <a:latin typeface="Courier" charset="0"/>
-              <a:ea typeface="Courier" charset="0"/>
-              <a:cs typeface="Courier" charset="0"/>
-            </a:endParaRPr>
           </a:p>
           <a:p>
             <a:pPr marL="285750" indent="-285750">
@@ -10098,7 +9904,15 @@
                 <a:ea typeface="Courier" charset="0"/>
                 <a:cs typeface="Courier" charset="0"/>
               </a:rPr>
-              <a:t>Update </a:t>
+              <a:t>Update frontend/</a:t>
+            </a:r>
+            <a:r>
+              <a:rPr lang="en-US" sz="2400" dirty="0" err="1" smtClean="0">
+                <a:latin typeface="Courier" charset="0"/>
+                <a:ea typeface="Courier" charset="0"/>
+                <a:cs typeface="Courier" charset="0"/>
+              </a:rPr>
+              <a:t>index.html</a:t>
             </a:r>
             <a:r>
               <a:rPr lang="en-US" sz="2400" dirty="0" smtClean="0">
@@ -10106,29 +9920,8 @@
                 <a:ea typeface="Courier" charset="0"/>
                 <a:cs typeface="Courier" charset="0"/>
               </a:rPr>
-              <a:t>frontend/</a:t>
-            </a:r>
-            <a:r>
-              <a:rPr lang="en-US" sz="2400" dirty="0" err="1" smtClean="0">
-                <a:latin typeface="Courier" charset="0"/>
-                <a:ea typeface="Courier" charset="0"/>
-                <a:cs typeface="Courier" charset="0"/>
-              </a:rPr>
-              <a:t>index.html</a:t>
-            </a:r>
-            <a:r>
-              <a:rPr lang="en-US" sz="2400" dirty="0" smtClean="0">
-                <a:latin typeface="Courier" charset="0"/>
-                <a:ea typeface="Courier" charset="0"/>
-                <a:cs typeface="Courier" charset="0"/>
-              </a:rPr>
               <a:t> and deploy (optional)</a:t>
             </a:r>
-            <a:endParaRPr lang="en-US" sz="2400" dirty="0" smtClean="0">
-              <a:latin typeface="Courier" charset="0"/>
-              <a:ea typeface="Courier" charset="0"/>
-              <a:cs typeface="Courier" charset="0"/>
-            </a:endParaRPr>
           </a:p>
         </p:txBody>
       </p:sp>

</xml_diff>